<commit_message>
support index number as special shape name
You can specify the shape by index number by whole running number of shape
in the document by "#n" or running number in the specified slide by "#m.n".
These forms are usefull for read-only document or old Power Point 2007.
</commit_message>
<xml_diff>
--- a/test/testdoc/testppt.pptx
+++ b/test/testdoc/testppt.pptx
@@ -6,6 +6,7 @@
   </p:sldMasterIdLst>
   <p:sldIdLst>
     <p:sldId id="256" r:id="rId2"/>
+    <p:sldId id="257" r:id="rId3"/>
   </p:sldIdLst>
   <p:sldSz cx="9144000" cy="6858000" type="screen4x3"/>
   <p:notesSz cx="6858000" cy="9144000"/>
@@ -104,6 +105,22 @@
       </a:defRPr>
     </a:lvl9pPr>
   </p:defaultTextStyle>
+  <p:extLst>
+    <p:ext uri="{EFAFB233-063F-42B5-8137-9DF3F51BA10A}">
+      <p15:sldGuideLst xmlns:p15="http://schemas.microsoft.com/office/powerpoint/2012/main">
+        <p15:guide id="1" orient="horz" pos="2160">
+          <p15:clr>
+            <a:srgbClr val="A4A3A4"/>
+          </p15:clr>
+        </p15:guide>
+        <p15:guide id="2" pos="2880">
+          <p15:clr>
+            <a:srgbClr val="A4A3A4"/>
+          </p15:clr>
+        </p15:guide>
+      </p15:sldGuideLst>
+    </p:ext>
+  </p:extLst>
 </p:presentation>
 </file>
 
@@ -288,7 +305,7 @@
           <a:p>
             <a:fld id="{63271EFF-DC2E-4E35-93F8-F4CE3E029244}" type="datetimeFigureOut">
               <a:rPr kumimoji="1" lang="ja-JP" altLang="en-US" smtClean="0"/>
-              <a:t>2013/3/17</a:t>
+              <a:t>2014/8/13</a:t>
             </a:fld>
             <a:endParaRPr kumimoji="1" lang="ja-JP" altLang="en-US"/>
           </a:p>
@@ -490,7 +507,7 @@
           <a:p>
             <a:fld id="{63271EFF-DC2E-4E35-93F8-F4CE3E029244}" type="datetimeFigureOut">
               <a:rPr kumimoji="1" lang="ja-JP" altLang="en-US" smtClean="0"/>
-              <a:t>2013/3/17</a:t>
+              <a:t>2014/8/13</a:t>
             </a:fld>
             <a:endParaRPr kumimoji="1" lang="ja-JP" altLang="en-US"/>
           </a:p>
@@ -702,7 +719,7 @@
           <a:p>
             <a:fld id="{63271EFF-DC2E-4E35-93F8-F4CE3E029244}" type="datetimeFigureOut">
               <a:rPr kumimoji="1" lang="ja-JP" altLang="en-US" smtClean="0"/>
-              <a:t>2013/3/17</a:t>
+              <a:t>2014/8/13</a:t>
             </a:fld>
             <a:endParaRPr kumimoji="1" lang="ja-JP" altLang="en-US"/>
           </a:p>
@@ -904,7 +921,7 @@
           <a:p>
             <a:fld id="{63271EFF-DC2E-4E35-93F8-F4CE3E029244}" type="datetimeFigureOut">
               <a:rPr kumimoji="1" lang="ja-JP" altLang="en-US" smtClean="0"/>
-              <a:t>2013/3/17</a:t>
+              <a:t>2014/8/13</a:t>
             </a:fld>
             <a:endParaRPr kumimoji="1" lang="ja-JP" altLang="en-US"/>
           </a:p>
@@ -1150,7 +1167,7 @@
           <a:p>
             <a:fld id="{63271EFF-DC2E-4E35-93F8-F4CE3E029244}" type="datetimeFigureOut">
               <a:rPr kumimoji="1" lang="ja-JP" altLang="en-US" smtClean="0"/>
-              <a:t>2013/3/17</a:t>
+              <a:t>2014/8/13</a:t>
             </a:fld>
             <a:endParaRPr kumimoji="1" lang="ja-JP" altLang="en-US"/>
           </a:p>
@@ -1502,7 +1519,7 @@
           <a:p>
             <a:fld id="{63271EFF-DC2E-4E35-93F8-F4CE3E029244}" type="datetimeFigureOut">
               <a:rPr kumimoji="1" lang="ja-JP" altLang="en-US" smtClean="0"/>
-              <a:t>2013/3/17</a:t>
+              <a:t>2014/8/13</a:t>
             </a:fld>
             <a:endParaRPr kumimoji="1" lang="ja-JP" altLang="en-US"/>
           </a:p>
@@ -1988,7 +2005,7 @@
           <a:p>
             <a:fld id="{63271EFF-DC2E-4E35-93F8-F4CE3E029244}" type="datetimeFigureOut">
               <a:rPr kumimoji="1" lang="ja-JP" altLang="en-US" smtClean="0"/>
-              <a:t>2013/3/17</a:t>
+              <a:t>2014/8/13</a:t>
             </a:fld>
             <a:endParaRPr kumimoji="1" lang="ja-JP" altLang="en-US"/>
           </a:p>
@@ -2106,7 +2123,7 @@
           <a:p>
             <a:fld id="{63271EFF-DC2E-4E35-93F8-F4CE3E029244}" type="datetimeFigureOut">
               <a:rPr kumimoji="1" lang="ja-JP" altLang="en-US" smtClean="0"/>
-              <a:t>2013/3/17</a:t>
+              <a:t>2014/8/13</a:t>
             </a:fld>
             <a:endParaRPr kumimoji="1" lang="ja-JP" altLang="en-US"/>
           </a:p>
@@ -2201,7 +2218,7 @@
           <a:p>
             <a:fld id="{63271EFF-DC2E-4E35-93F8-F4CE3E029244}" type="datetimeFigureOut">
               <a:rPr kumimoji="1" lang="ja-JP" altLang="en-US" smtClean="0"/>
-              <a:t>2013/3/17</a:t>
+              <a:t>2014/8/13</a:t>
             </a:fld>
             <a:endParaRPr kumimoji="1" lang="ja-JP" altLang="en-US"/>
           </a:p>
@@ -2510,7 +2527,7 @@
           <a:p>
             <a:fld id="{63271EFF-DC2E-4E35-93F8-F4CE3E029244}" type="datetimeFigureOut">
               <a:rPr kumimoji="1" lang="ja-JP" altLang="en-US" smtClean="0"/>
-              <a:t>2013/3/17</a:t>
+              <a:t>2014/8/13</a:t>
             </a:fld>
             <a:endParaRPr kumimoji="1" lang="ja-JP" altLang="en-US"/>
           </a:p>
@@ -2763,7 +2780,7 @@
           <a:p>
             <a:fld id="{63271EFF-DC2E-4E35-93F8-F4CE3E029244}" type="datetimeFigureOut">
               <a:rPr kumimoji="1" lang="ja-JP" altLang="en-US" smtClean="0"/>
-              <a:t>2013/3/17</a:t>
+              <a:t>2014/8/13</a:t>
             </a:fld>
             <a:endParaRPr kumimoji="1" lang="ja-JP" altLang="en-US"/>
           </a:p>
@@ -3008,7 +3025,7 @@
           <a:p>
             <a:fld id="{63271EFF-DC2E-4E35-93F8-F4CE3E029244}" type="datetimeFigureOut">
               <a:rPr kumimoji="1" lang="ja-JP" altLang="en-US" smtClean="0"/>
-              <a:t>2013/3/17</a:t>
+              <a:t>2014/8/13</a:t>
             </a:fld>
             <a:endParaRPr kumimoji="1" lang="ja-JP" altLang="en-US"/>
           </a:p>
@@ -3386,7 +3403,9 @@
       <p:grpSp>
         <p:nvGrpSpPr>
           <p:cNvPr id="7" name="グループ化 6" descr="shape-descr" title="shape-title"/>
-          <p:cNvGrpSpPr/>
+          <p:cNvGrpSpPr>
+            <a:grpSpLocks/>
+          </p:cNvGrpSpPr>
           <p:nvPr/>
         </p:nvGrpSpPr>
         <p:grpSpPr>
@@ -3482,6 +3501,80 @@
     <p:extLst>
       <p:ext uri="{BB962C8B-B14F-4D97-AF65-F5344CB8AC3E}">
         <p14:creationId xmlns:p14="http://schemas.microsoft.com/office/powerpoint/2010/main" val="2518595594"/>
+      </p:ext>
+    </p:extLst>
+  </p:cSld>
+  <p:clrMapOvr>
+    <a:masterClrMapping/>
+  </p:clrMapOvr>
+</p:sld>
+</file>
+
+<file path=ppt/slides/slide2.xml><?xml version="1.0" encoding="utf-8"?>
+<p:sld xmlns:a="http://schemas.openxmlformats.org/drawingml/2006/main" xmlns:r="http://schemas.openxmlformats.org/officeDocument/2006/relationships" xmlns:p="http://schemas.openxmlformats.org/presentationml/2006/main">
+  <p:cSld>
+    <p:spTree>
+      <p:nvGrpSpPr>
+        <p:cNvPr id="1" name=""/>
+        <p:cNvGrpSpPr/>
+        <p:nvPr/>
+      </p:nvGrpSpPr>
+      <p:grpSpPr>
+        <a:xfrm>
+          <a:off x="0" y="0"/>
+          <a:ext cx="0" cy="0"/>
+          <a:chOff x="0" y="0"/>
+          <a:chExt cx="0" cy="0"/>
+        </a:xfrm>
+      </p:grpSpPr>
+      <p:sp>
+        <p:nvSpPr>
+          <p:cNvPr id="4" name="爆発 2 3"/>
+          <p:cNvSpPr/>
+          <p:nvPr/>
+        </p:nvSpPr>
+        <p:spPr>
+          <a:xfrm>
+            <a:off x="1115616" y="2204864"/>
+            <a:ext cx="3312368" cy="1512168"/>
+          </a:xfrm>
+          <a:prstGeom prst="irregularSeal2">
+            <a:avLst/>
+          </a:prstGeom>
+        </p:spPr>
+        <p:style>
+          <a:lnRef idx="2">
+            <a:schemeClr val="accent1">
+              <a:shade val="50000"/>
+            </a:schemeClr>
+          </a:lnRef>
+          <a:fillRef idx="1">
+            <a:schemeClr val="accent1"/>
+          </a:fillRef>
+          <a:effectRef idx="0">
+            <a:schemeClr val="accent1"/>
+          </a:effectRef>
+          <a:fontRef idx="minor">
+            <a:schemeClr val="lt1"/>
+          </a:fontRef>
+        </p:style>
+        <p:txBody>
+          <a:bodyPr rtlCol="0" anchor="ctr"/>
+          <a:lstStyle/>
+          <a:p>
+            <a:pPr algn="ctr"/>
+            <a:r>
+              <a:rPr kumimoji="1" lang="en-US" altLang="ja-JP" smtClean="0"/>
+              <a:t>No named shape</a:t>
+            </a:r>
+            <a:endParaRPr kumimoji="1" lang="ja-JP" altLang="en-US" dirty="0"/>
+          </a:p>
+        </p:txBody>
+      </p:sp>
+    </p:spTree>
+    <p:extLst>
+      <p:ext uri="{BB962C8B-B14F-4D97-AF65-F5344CB8AC3E}">
+        <p14:creationId xmlns:p14="http://schemas.microsoft.com/office/powerpoint/2010/main" val="951845302"/>
       </p:ext>
     </p:extLst>
   </p:cSld>

</xml_diff>